<commit_message>
lectures and slides up through 15
</commit_message>
<xml_diff>
--- a/Lecture_Slides/PH 123 Lecture 07.pptx
+++ b/Lecture_Slides/PH 123 Lecture 07.pptx
@@ -214,10 +214,25 @@
   <pc:docChgLst>
     <pc:chgData name="Lines, Todd" userId="afaf7c3a-e8aa-4568-882a-02ad8f9e19b0" providerId="ADAL" clId="{F43357A8-8223-484B-94C2-3B83B6BF38BF}"/>
     <pc:docChg chg="custSel addSld delSld modSld">
-      <pc:chgData name="Lines, Todd" userId="afaf7c3a-e8aa-4568-882a-02ad8f9e19b0" providerId="ADAL" clId="{F43357A8-8223-484B-94C2-3B83B6BF38BF}" dt="2025-04-28T23:11:31.600" v="11"/>
+      <pc:chgData name="Lines, Todd" userId="afaf7c3a-e8aa-4568-882a-02ad8f9e19b0" providerId="ADAL" clId="{F43357A8-8223-484B-94C2-3B83B6BF38BF}" dt="2025-04-30T21:15:16.155" v="20" actId="20577"/>
       <pc:docMkLst>
         <pc:docMk/>
       </pc:docMkLst>
+      <pc:sldChg chg="modSp mod">
+        <pc:chgData name="Lines, Todd" userId="afaf7c3a-e8aa-4568-882a-02ad8f9e19b0" providerId="ADAL" clId="{F43357A8-8223-484B-94C2-3B83B6BF38BF}" dt="2025-04-30T21:15:16.155" v="20" actId="20577"/>
+        <pc:sldMkLst>
+          <pc:docMk/>
+          <pc:sldMk cId="0" sldId="256"/>
+        </pc:sldMkLst>
+        <pc:spChg chg="mod">
+          <ac:chgData name="Lines, Todd" userId="afaf7c3a-e8aa-4568-882a-02ad8f9e19b0" providerId="ADAL" clId="{F43357A8-8223-484B-94C2-3B83B6BF38BF}" dt="2025-04-30T21:15:16.155" v="20" actId="20577"/>
+          <ac:spMkLst>
+            <pc:docMk/>
+            <pc:sldMk cId="0" sldId="256"/>
+            <ac:spMk id="2" creationId="{00000000-0000-0000-0000-000000000000}"/>
+          </ac:spMkLst>
+        </pc:spChg>
+      </pc:sldChg>
       <pc:sldChg chg="add">
         <pc:chgData name="Lines, Todd" userId="afaf7c3a-e8aa-4568-882a-02ad8f9e19b0" providerId="ADAL" clId="{F43357A8-8223-484B-94C2-3B83B6BF38BF}" dt="2025-04-28T23:08:29.610" v="9"/>
         <pc:sldMkLst>
@@ -525,22 +540,6 @@
           <pc:docMk/>
           <pc:sldMk cId="4277541500" sldId="343"/>
         </pc:sldMkLst>
-        <pc:spChg chg="del mod ord">
-          <ac:chgData name="Lines, Todd" userId="afaf7c3a-e8aa-4568-882a-02ad8f9e19b0" providerId="ADAL" clId="{F43357A8-8223-484B-94C2-3B83B6BF38BF}" dt="2025-04-28T23:07:43.359" v="5" actId="700"/>
-          <ac:spMkLst>
-            <pc:docMk/>
-            <pc:sldMk cId="4277541500" sldId="343"/>
-            <ac:spMk id="2" creationId="{3B87D590-8FCC-6CAC-A0C2-806B2120FD2D}"/>
-          </ac:spMkLst>
-        </pc:spChg>
-        <pc:spChg chg="del mod ord">
-          <ac:chgData name="Lines, Todd" userId="afaf7c3a-e8aa-4568-882a-02ad8f9e19b0" providerId="ADAL" clId="{F43357A8-8223-484B-94C2-3B83B6BF38BF}" dt="2025-04-28T23:07:43.359" v="5" actId="700"/>
-          <ac:spMkLst>
-            <pc:docMk/>
-            <pc:sldMk cId="4277541500" sldId="343"/>
-            <ac:spMk id="3" creationId="{C8F3ACE3-AA4F-0FE1-F70C-32131B1B3D8D}"/>
-          </ac:spMkLst>
-        </pc:spChg>
         <pc:spChg chg="add mod ord">
           <ac:chgData name="Lines, Todd" userId="afaf7c3a-e8aa-4568-882a-02ad8f9e19b0" providerId="ADAL" clId="{F43357A8-8223-484B-94C2-3B83B6BF38BF}" dt="2025-04-28T23:07:45.631" v="8" actId="20577"/>
           <ac:spMkLst>
@@ -716,7 +715,7 @@
             <a:fld id="{607C28BD-B451-44CB-8598-76CA2A7DC8BD}" type="datetimeFigureOut">
               <a:rPr lang="en-US" smtClean="0"/>
               <a:pPr/>
-              <a:t>4/28/2025</a:t>
+              <a:t>4/30/2025</a:t>
             </a:fld>
             <a:endParaRPr lang="en-US"/>
           </a:p>
@@ -1781,7 +1780,7 @@
             <a:fld id="{58A85C90-C599-4103-B9D8-F35C9EFD2BC3}" type="datetimeFigureOut">
               <a:rPr lang="en-US" smtClean="0"/>
               <a:pPr/>
-              <a:t>4/28/2025</a:t>
+              <a:t>4/30/2025</a:t>
             </a:fld>
             <a:endParaRPr lang="en-US"/>
           </a:p>
@@ -1946,7 +1945,7 @@
             <a:fld id="{58A85C90-C599-4103-B9D8-F35C9EFD2BC3}" type="datetimeFigureOut">
               <a:rPr lang="en-US" smtClean="0"/>
               <a:pPr/>
-              <a:t>4/28/2025</a:t>
+              <a:t>4/30/2025</a:t>
             </a:fld>
             <a:endParaRPr lang="en-US"/>
           </a:p>
@@ -2121,7 +2120,7 @@
             <a:fld id="{58A85C90-C599-4103-B9D8-F35C9EFD2BC3}" type="datetimeFigureOut">
               <a:rPr lang="en-US" smtClean="0"/>
               <a:pPr/>
-              <a:t>4/28/2025</a:t>
+              <a:t>4/30/2025</a:t>
             </a:fld>
             <a:endParaRPr lang="en-US"/>
           </a:p>
@@ -2546,7 +2545,7 @@
             <a:fld id="{58A85C90-C599-4103-B9D8-F35C9EFD2BC3}" type="datetimeFigureOut">
               <a:rPr lang="en-US" smtClean="0"/>
               <a:pPr/>
-              <a:t>4/28/2025</a:t>
+              <a:t>4/30/2025</a:t>
             </a:fld>
             <a:endParaRPr lang="en-US"/>
           </a:p>
@@ -2788,7 +2787,7 @@
             <a:fld id="{58A85C90-C599-4103-B9D8-F35C9EFD2BC3}" type="datetimeFigureOut">
               <a:rPr lang="en-US" smtClean="0"/>
               <a:pPr/>
-              <a:t>4/28/2025</a:t>
+              <a:t>4/30/2025</a:t>
             </a:fld>
             <a:endParaRPr lang="en-US"/>
           </a:p>
@@ -3070,7 +3069,7 @@
             <a:fld id="{58A85C90-C599-4103-B9D8-F35C9EFD2BC3}" type="datetimeFigureOut">
               <a:rPr lang="en-US" smtClean="0"/>
               <a:pPr/>
-              <a:t>4/28/2025</a:t>
+              <a:t>4/30/2025</a:t>
             </a:fld>
             <a:endParaRPr lang="en-US"/>
           </a:p>
@@ -3486,7 +3485,7 @@
             <a:fld id="{58A85C90-C599-4103-B9D8-F35C9EFD2BC3}" type="datetimeFigureOut">
               <a:rPr lang="en-US" smtClean="0"/>
               <a:pPr/>
-              <a:t>4/28/2025</a:t>
+              <a:t>4/30/2025</a:t>
             </a:fld>
             <a:endParaRPr lang="en-US"/>
           </a:p>
@@ -3600,7 +3599,7 @@
             <a:fld id="{58A85C90-C599-4103-B9D8-F35C9EFD2BC3}" type="datetimeFigureOut">
               <a:rPr lang="en-US" smtClean="0"/>
               <a:pPr/>
-              <a:t>4/28/2025</a:t>
+              <a:t>4/30/2025</a:t>
             </a:fld>
             <a:endParaRPr lang="en-US"/>
           </a:p>
@@ -3692,7 +3691,7 @@
             <a:fld id="{58A85C90-C599-4103-B9D8-F35C9EFD2BC3}" type="datetimeFigureOut">
               <a:rPr lang="en-US" smtClean="0"/>
               <a:pPr/>
-              <a:t>4/28/2025</a:t>
+              <a:t>4/30/2025</a:t>
             </a:fld>
             <a:endParaRPr lang="en-US"/>
           </a:p>
@@ -3964,7 +3963,7 @@
             <a:fld id="{58A85C90-C599-4103-B9D8-F35C9EFD2BC3}" type="datetimeFigureOut">
               <a:rPr lang="en-US" smtClean="0"/>
               <a:pPr/>
-              <a:t>4/28/2025</a:t>
+              <a:t>4/30/2025</a:t>
             </a:fld>
             <a:endParaRPr lang="en-US"/>
           </a:p>
@@ -4213,7 +4212,7 @@
             <a:fld id="{58A85C90-C599-4103-B9D8-F35C9EFD2BC3}" type="datetimeFigureOut">
               <a:rPr lang="en-US" smtClean="0"/>
               <a:pPr/>
-              <a:t>4/28/2025</a:t>
+              <a:t>4/30/2025</a:t>
             </a:fld>
             <a:endParaRPr lang="en-US"/>
           </a:p>
@@ -4421,7 +4420,7 @@
             <a:fld id="{58A85C90-C599-4103-B9D8-F35C9EFD2BC3}" type="datetimeFigureOut">
               <a:rPr lang="en-US" smtClean="0"/>
               <a:pPr/>
-              <a:t>4/28/2025</a:t>
+              <a:t>4/30/2025</a:t>
             </a:fld>
             <a:endParaRPr lang="en-US"/>
           </a:p>
@@ -4808,7 +4807,10 @@
           <a:bodyPr/>
           <a:lstStyle/>
           <a:p>
-            <a:endParaRPr lang="en-US"/>
+            <a:r>
+              <a:rPr lang="en-US" dirty="0"/>
+              <a:t>Lecture 7</a:t>
+            </a:r>
           </a:p>
         </p:txBody>
       </p:sp>

</xml_diff>